<commit_message>
Smart Food Powerpoint v2.0
</commit_message>
<xml_diff>
--- a/Smart Food.pptx
+++ b/Smart Food.pptx
@@ -7,10 +7,12 @@
   <p:sldIdLst>
     <p:sldId id="256" r:id="rId2"/>
     <p:sldId id="257" r:id="rId3"/>
-    <p:sldId id="259" r:id="rId4"/>
-    <p:sldId id="260" r:id="rId5"/>
+    <p:sldId id="264" r:id="rId4"/>
+    <p:sldId id="259" r:id="rId5"/>
     <p:sldId id="261" r:id="rId6"/>
-    <p:sldId id="258" r:id="rId7"/>
+    <p:sldId id="263" r:id="rId7"/>
+    <p:sldId id="262" r:id="rId8"/>
+    <p:sldId id="258" r:id="rId9"/>
   </p:sldIdLst>
   <p:sldSz cx="9144000" cy="6858000" type="screen4x3"/>
   <p:notesSz cx="6858000" cy="9144000"/>
@@ -3372,14 +3374,7 @@
                 <a:latin typeface="Times New Roman" panose="02020603050405020304" pitchFamily="18" charset="0"/>
                 <a:cs typeface="Times New Roman" panose="02020603050405020304" pitchFamily="18" charset="0"/>
               </a:rPr>
-              <a:t>food </a:t>
-            </a:r>
-            <a:r>
-              <a:rPr lang="en-US" sz="4400" dirty="0" smtClean="0">
-                <a:latin typeface="Times New Roman" panose="02020603050405020304" pitchFamily="18" charset="0"/>
-                <a:cs typeface="Times New Roman" panose="02020603050405020304" pitchFamily="18" charset="0"/>
-              </a:rPr>
-              <a:t>is “the single largest type of waste entering our landfills”</a:t>
+              <a:t>food is “the single largest type of waste entering our landfills”</a:t>
             </a:r>
             <a:r>
               <a:rPr lang="en-US" sz="2200" dirty="0" smtClean="0">
@@ -3459,8 +3454,15 @@
           <a:lstStyle/>
           <a:p>
             <a:r>
+              <a:rPr lang="en-US" dirty="0" smtClean="0">
+                <a:latin typeface="Times New Roman" panose="02020603050405020304" pitchFamily="18" charset="0"/>
+                <a:cs typeface="Times New Roman" panose="02020603050405020304" pitchFamily="18" charset="0"/>
+              </a:rPr>
+              <a:t>Customer</a:t>
+            </a:r>
+            <a:r>
               <a:rPr lang="en-US" dirty="0" smtClean="0"/>
-              <a:t>Sample Interview Answers</a:t>
+              <a:t> Segment</a:t>
             </a:r>
             <a:endParaRPr lang="en-US" dirty="0"/>
           </a:p>
@@ -3478,84 +3480,125 @@
         </p:nvSpPr>
         <p:spPr/>
         <p:txBody>
-          <a:bodyPr>
-            <a:normAutofit fontScale="92500" lnSpcReduction="10000"/>
-          </a:bodyPr>
-          <a:lstStyle/>
-          <a:p>
-            <a:pPr marL="0" indent="0">
-              <a:buNone/>
-            </a:pPr>
-            <a:r>
-              <a:rPr lang="en-US" dirty="0" smtClean="0"/>
-              <a:t>1. How much food do you waste (percentage wise)?</a:t>
-            </a:r>
-          </a:p>
-          <a:p>
-            <a:pPr marL="0" indent="0">
-              <a:buNone/>
-            </a:pPr>
-            <a:endParaRPr lang="en-US" dirty="0" smtClean="0"/>
-          </a:p>
-          <a:p>
-            <a:pPr marL="0" indent="0">
-              <a:buNone/>
-            </a:pPr>
-            <a:r>
-              <a:rPr lang="en-US" dirty="0" smtClean="0"/>
-              <a:t>-”Umm percentage wise id probably say like 15% 20% or so.”</a:t>
-            </a:r>
-          </a:p>
-          <a:p>
-            <a:pPr marL="0" indent="0">
-              <a:buNone/>
-            </a:pPr>
-            <a:r>
-              <a:rPr lang="en-US" dirty="0" smtClean="0"/>
-              <a:t>-”Umm maybe about a quarter I’d say. I don’t live here I live in California so I’ve got </a:t>
-            </a:r>
-            <a:r>
-              <a:rPr lang="en-US" dirty="0" err="1" smtClean="0"/>
-              <a:t>famliy</a:t>
-            </a:r>
-            <a:r>
-              <a:rPr lang="en-US" dirty="0" smtClean="0"/>
-              <a:t>, so yeah.”</a:t>
-            </a:r>
-          </a:p>
-          <a:p>
-            <a:pPr marL="0" indent="0">
-              <a:buNone/>
-            </a:pPr>
-            <a:r>
-              <a:rPr lang="en-US" dirty="0" smtClean="0"/>
-              <a:t>-”Percentage wise probably 5%”</a:t>
-            </a:r>
-          </a:p>
-          <a:p>
-            <a:pPr marL="0" indent="0">
-              <a:buNone/>
-            </a:pPr>
-            <a:r>
-              <a:rPr lang="en-US" dirty="0" smtClean="0"/>
-              <a:t>-”Umm maybe like 10-15%”</a:t>
-            </a:r>
-          </a:p>
-          <a:p>
-            <a:pPr marL="0" indent="0">
-              <a:buNone/>
-            </a:pPr>
-            <a:r>
-              <a:rPr lang="en-US" dirty="0" smtClean="0"/>
-              <a:t>-”Say maybe 5-10%; I eat a lot”</a:t>
-            </a:r>
+          <a:bodyPr/>
+          <a:lstStyle/>
+          <a:p>
+            <a:r>
+              <a:rPr lang="en-US" dirty="0">
+                <a:latin typeface="Times New Roman" panose="02020603050405020304" pitchFamily="18" charset="0"/>
+                <a:cs typeface="Times New Roman" panose="02020603050405020304" pitchFamily="18" charset="0"/>
+              </a:rPr>
+              <a:t>The customer segment that we’ve targeted </a:t>
+            </a:r>
+            <a:r>
+              <a:rPr lang="en-US" dirty="0" smtClean="0">
+                <a:latin typeface="Times New Roman" panose="02020603050405020304" pitchFamily="18" charset="0"/>
+                <a:cs typeface="Times New Roman" panose="02020603050405020304" pitchFamily="18" charset="0"/>
+              </a:rPr>
+              <a:t>are:</a:t>
+            </a:r>
+          </a:p>
+          <a:p>
+            <a:pPr lvl="1"/>
+            <a:r>
+              <a:rPr lang="en-US" dirty="0" smtClean="0">
+                <a:latin typeface="Times New Roman" panose="02020603050405020304" pitchFamily="18" charset="0"/>
+                <a:cs typeface="Times New Roman" panose="02020603050405020304" pitchFamily="18" charset="0"/>
+              </a:rPr>
+              <a:t>Middle </a:t>
+            </a:r>
+            <a:r>
+              <a:rPr lang="en-US" dirty="0">
+                <a:latin typeface="Times New Roman" panose="02020603050405020304" pitchFamily="18" charset="0"/>
+                <a:cs typeface="Times New Roman" panose="02020603050405020304" pitchFamily="18" charset="0"/>
+              </a:rPr>
+              <a:t>to lower class ($30,000-$65,000 annual salary) </a:t>
+            </a:r>
+            <a:r>
+              <a:rPr lang="en-US" dirty="0" smtClean="0">
+                <a:latin typeface="Times New Roman" panose="02020603050405020304" pitchFamily="18" charset="0"/>
+                <a:cs typeface="Times New Roman" panose="02020603050405020304" pitchFamily="18" charset="0"/>
+              </a:rPr>
+              <a:t>families</a:t>
+            </a:r>
+          </a:p>
+          <a:p>
+            <a:pPr lvl="1"/>
+            <a:r>
+              <a:rPr lang="en-US" dirty="0">
+                <a:latin typeface="Times New Roman" panose="02020603050405020304" pitchFamily="18" charset="0"/>
+                <a:cs typeface="Times New Roman" panose="02020603050405020304" pitchFamily="18" charset="0"/>
+              </a:rPr>
+              <a:t>M</a:t>
+            </a:r>
+            <a:r>
+              <a:rPr lang="en-US" dirty="0" smtClean="0">
+                <a:latin typeface="Times New Roman" panose="02020603050405020304" pitchFamily="18" charset="0"/>
+                <a:cs typeface="Times New Roman" panose="02020603050405020304" pitchFamily="18" charset="0"/>
+              </a:rPr>
+              <a:t>ore </a:t>
+            </a:r>
+            <a:r>
+              <a:rPr lang="en-US" dirty="0">
+                <a:latin typeface="Times New Roman" panose="02020603050405020304" pitchFamily="18" charset="0"/>
+                <a:cs typeface="Times New Roman" panose="02020603050405020304" pitchFamily="18" charset="0"/>
+              </a:rPr>
+              <a:t>than two members, with 2 working </a:t>
+            </a:r>
+            <a:r>
+              <a:rPr lang="en-US" dirty="0" smtClean="0">
+                <a:latin typeface="Times New Roman" panose="02020603050405020304" pitchFamily="18" charset="0"/>
+                <a:cs typeface="Times New Roman" panose="02020603050405020304" pitchFamily="18" charset="0"/>
+              </a:rPr>
+              <a:t>members</a:t>
+            </a:r>
+          </a:p>
+          <a:p>
+            <a:pPr lvl="1"/>
+            <a:r>
+              <a:rPr lang="en-US" dirty="0" smtClean="0">
+                <a:latin typeface="Times New Roman" panose="02020603050405020304" pitchFamily="18" charset="0"/>
+                <a:cs typeface="Times New Roman" panose="02020603050405020304" pitchFamily="18" charset="0"/>
+              </a:rPr>
+              <a:t>Homeowners</a:t>
+            </a:r>
+          </a:p>
+          <a:p>
+            <a:pPr lvl="1"/>
+            <a:r>
+              <a:rPr lang="en-US" dirty="0">
+                <a:latin typeface="Times New Roman" panose="02020603050405020304" pitchFamily="18" charset="0"/>
+                <a:cs typeface="Times New Roman" panose="02020603050405020304" pitchFamily="18" charset="0"/>
+              </a:rPr>
+              <a:t>I</a:t>
+            </a:r>
+            <a:r>
+              <a:rPr lang="en-US" dirty="0" smtClean="0">
+                <a:latin typeface="Times New Roman" panose="02020603050405020304" pitchFamily="18" charset="0"/>
+                <a:cs typeface="Times New Roman" panose="02020603050405020304" pitchFamily="18" charset="0"/>
+              </a:rPr>
+              <a:t>nclined </a:t>
+            </a:r>
+            <a:r>
+              <a:rPr lang="en-US" dirty="0">
+                <a:latin typeface="Times New Roman" panose="02020603050405020304" pitchFamily="18" charset="0"/>
+                <a:cs typeface="Times New Roman" panose="02020603050405020304" pitchFamily="18" charset="0"/>
+              </a:rPr>
+              <a:t>to purchase the latest technology.</a:t>
+            </a:r>
+          </a:p>
+          <a:p>
+            <a:endParaRPr lang="en-US" dirty="0">
+              <a:latin typeface="Times New Roman" panose="02020603050405020304" pitchFamily="18" charset="0"/>
+              <a:cs typeface="Times New Roman" panose="02020603050405020304" pitchFamily="18" charset="0"/>
+            </a:endParaRPr>
           </a:p>
         </p:txBody>
       </p:sp>
     </p:spTree>
     <p:extLst>
       <p:ext uri="{BB962C8B-B14F-4D97-AF65-F5344CB8AC3E}">
-        <p14:creationId xmlns:p14="http://schemas.microsoft.com/office/powerpoint/2010/main" val="3039021095"/>
+        <p14:creationId xmlns:p14="http://schemas.microsoft.com/office/powerpoint/2010/main" val="1963417443"/>
       </p:ext>
     </p:extLst>
   </p:cSld>
@@ -3598,10 +3641,16 @@
           <a:lstStyle/>
           <a:p>
             <a:r>
-              <a:rPr lang="en-US" dirty="0" smtClean="0"/>
+              <a:rPr lang="en-US" dirty="0" smtClean="0">
+                <a:latin typeface="Times New Roman" panose="02020603050405020304" pitchFamily="18" charset="0"/>
+                <a:cs typeface="Times New Roman" panose="02020603050405020304" pitchFamily="18" charset="0"/>
+              </a:rPr>
               <a:t>Sample Interview Answers</a:t>
             </a:r>
-            <a:endParaRPr lang="en-US" dirty="0"/>
+            <a:endParaRPr lang="en-US" dirty="0">
+              <a:latin typeface="Times New Roman" panose="02020603050405020304" pitchFamily="18" charset="0"/>
+              <a:cs typeface="Times New Roman" panose="02020603050405020304" pitchFamily="18" charset="0"/>
+            </a:endParaRPr>
           </a:p>
         </p:txBody>
       </p:sp>
@@ -3618,7 +3667,7 @@
         <p:spPr/>
         <p:txBody>
           <a:bodyPr>
-            <a:normAutofit fontScale="92500" lnSpcReduction="20000"/>
+            <a:normAutofit fontScale="92500"/>
           </a:bodyPr>
           <a:lstStyle/>
           <a:p>
@@ -3626,23 +3675,32 @@
               <a:buNone/>
             </a:pPr>
             <a:r>
-              <a:rPr lang="en-US" dirty="0" smtClean="0"/>
-              <a:t>2. Who are you providing for?</a:t>
+              <a:rPr lang="en-US" dirty="0" smtClean="0">
+                <a:latin typeface="Times New Roman" panose="02020603050405020304" pitchFamily="18" charset="0"/>
+                <a:cs typeface="Times New Roman" panose="02020603050405020304" pitchFamily="18" charset="0"/>
+              </a:rPr>
+              <a:t>1. How much food do you waste (percentage wise)?</a:t>
             </a:r>
           </a:p>
           <a:p>
             <a:pPr marL="0" indent="0">
               <a:buNone/>
             </a:pPr>
-            <a:endParaRPr lang="en-US" dirty="0"/>
+            <a:endParaRPr lang="en-US" dirty="0" smtClean="0">
+              <a:latin typeface="Times New Roman" panose="02020603050405020304" pitchFamily="18" charset="0"/>
+              <a:cs typeface="Times New Roman" panose="02020603050405020304" pitchFamily="18" charset="0"/>
+            </a:endParaRPr>
           </a:p>
           <a:p>
             <a:pPr marL="0" indent="0">
               <a:buNone/>
             </a:pPr>
             <a:r>
-              <a:rPr lang="en-US" dirty="0" smtClean="0"/>
-              <a:t>-”Umm just myself. I don’t know a mix of healthy and taste, I don’t really know”</a:t>
+              <a:rPr lang="en-US" dirty="0" smtClean="0">
+                <a:latin typeface="Times New Roman" panose="02020603050405020304" pitchFamily="18" charset="0"/>
+                <a:cs typeface="Times New Roman" panose="02020603050405020304" pitchFamily="18" charset="0"/>
+              </a:rPr>
+              <a:t>-”Umm percentage wise id probably say like 15% 20% or so.”</a:t>
             </a:r>
           </a:p>
           <a:p>
@@ -3650,8 +3708,25 @@
               <a:buNone/>
             </a:pPr>
             <a:r>
-              <a:rPr lang="en-US" dirty="0" smtClean="0"/>
-              <a:t>-”There are five in our family. I look for fresh organic, low fat, low sugar especially low sugar, and just as healthy as I can make it.”</a:t>
+              <a:rPr lang="en-US" dirty="0" smtClean="0">
+                <a:latin typeface="Times New Roman" panose="02020603050405020304" pitchFamily="18" charset="0"/>
+                <a:cs typeface="Times New Roman" panose="02020603050405020304" pitchFamily="18" charset="0"/>
+              </a:rPr>
+              <a:t>-”Umm maybe about a quarter I’d say. I don’t live here I live in California so I’ve got </a:t>
+            </a:r>
+            <a:r>
+              <a:rPr lang="en-US" dirty="0" err="1" smtClean="0">
+                <a:latin typeface="Times New Roman" panose="02020603050405020304" pitchFamily="18" charset="0"/>
+                <a:cs typeface="Times New Roman" panose="02020603050405020304" pitchFamily="18" charset="0"/>
+              </a:rPr>
+              <a:t>famliy</a:t>
+            </a:r>
+            <a:r>
+              <a:rPr lang="en-US" dirty="0" smtClean="0">
+                <a:latin typeface="Times New Roman" panose="02020603050405020304" pitchFamily="18" charset="0"/>
+                <a:cs typeface="Times New Roman" panose="02020603050405020304" pitchFamily="18" charset="0"/>
+              </a:rPr>
+              <a:t>, so yeah.”</a:t>
             </a:r>
           </a:p>
           <a:p>
@@ -3659,8 +3734,18 @@
               <a:buNone/>
             </a:pPr>
             <a:r>
-              <a:rPr lang="en-US" dirty="0" smtClean="0"/>
-              <a:t>-”Its just us two.”</a:t>
+              <a:rPr lang="en-US" dirty="0" smtClean="0">
+                <a:latin typeface="Times New Roman" panose="02020603050405020304" pitchFamily="18" charset="0"/>
+                <a:cs typeface="Times New Roman" panose="02020603050405020304" pitchFamily="18" charset="0"/>
+              </a:rPr>
+              <a:t>-”</a:t>
+            </a:r>
+            <a:r>
+              <a:rPr lang="en-US" dirty="0" smtClean="0">
+                <a:latin typeface="Times New Roman" panose="02020603050405020304" pitchFamily="18" charset="0"/>
+                <a:cs typeface="Times New Roman" panose="02020603050405020304" pitchFamily="18" charset="0"/>
+              </a:rPr>
+              <a:t>Umm maybe like 10-15%”</a:t>
             </a:r>
           </a:p>
           <a:p>
@@ -3668,28 +3753,19 @@
               <a:buNone/>
             </a:pPr>
             <a:r>
-              <a:rPr lang="en-US" dirty="0" smtClean="0"/>
-              <a:t>-“just myself”</a:t>
-            </a:r>
-          </a:p>
-          <a:p>
-            <a:pPr marL="0" indent="0">
-              <a:buNone/>
-            </a:pPr>
-            <a:r>
-              <a:rPr lang="en-US" dirty="0" smtClean="0"/>
-              <a:t>-“Just myself, not my dorm.”</a:t>
-            </a:r>
-          </a:p>
-          <a:p>
-            <a:endParaRPr lang="en-US" dirty="0"/>
+              <a:rPr lang="en-US" dirty="0" smtClean="0">
+                <a:latin typeface="Times New Roman" panose="02020603050405020304" pitchFamily="18" charset="0"/>
+                <a:cs typeface="Times New Roman" panose="02020603050405020304" pitchFamily="18" charset="0"/>
+              </a:rPr>
+              <a:t>-”Say maybe 5-10%; I eat a lot”</a:t>
+            </a:r>
           </a:p>
         </p:txBody>
       </p:sp>
     </p:spTree>
     <p:extLst>
       <p:ext uri="{BB962C8B-B14F-4D97-AF65-F5344CB8AC3E}">
-        <p14:creationId xmlns:p14="http://schemas.microsoft.com/office/powerpoint/2010/main" val="1372540765"/>
+        <p14:creationId xmlns:p14="http://schemas.microsoft.com/office/powerpoint/2010/main" val="3039021095"/>
       </p:ext>
     </p:extLst>
   </p:cSld>
@@ -3732,10 +3808,16 @@
           <a:lstStyle/>
           <a:p>
             <a:r>
-              <a:rPr lang="en-US" dirty="0" smtClean="0"/>
+              <a:rPr lang="en-US" dirty="0" smtClean="0">
+                <a:latin typeface="Times New Roman" panose="02020603050405020304" pitchFamily="18" charset="0"/>
+                <a:cs typeface="Times New Roman" panose="02020603050405020304" pitchFamily="18" charset="0"/>
+              </a:rPr>
               <a:t>Sample Interview Answers</a:t>
             </a:r>
-            <a:endParaRPr lang="en-US" dirty="0"/>
+            <a:endParaRPr lang="en-US" dirty="0">
+              <a:latin typeface="Times New Roman" panose="02020603050405020304" pitchFamily="18" charset="0"/>
+              <a:cs typeface="Times New Roman" panose="02020603050405020304" pitchFamily="18" charset="0"/>
+            </a:endParaRPr>
           </a:p>
         </p:txBody>
       </p:sp>
@@ -3752,7 +3834,7 @@
         <p:spPr/>
         <p:txBody>
           <a:bodyPr>
-            <a:normAutofit fontScale="77500" lnSpcReduction="20000"/>
+            <a:normAutofit fontScale="92500" lnSpcReduction="20000"/>
           </a:bodyPr>
           <a:lstStyle/>
           <a:p>
@@ -3760,22 +3842,45 @@
               <a:buNone/>
             </a:pPr>
             <a:r>
-              <a:rPr lang="en-US" dirty="0" smtClean="0"/>
-              <a:t>3. Is it harder to buy higher quality food because it goes bad faster?</a:t>
+              <a:rPr lang="en-US" dirty="0">
+                <a:latin typeface="Times New Roman" panose="02020603050405020304" pitchFamily="18" charset="0"/>
+                <a:cs typeface="Times New Roman" panose="02020603050405020304" pitchFamily="18" charset="0"/>
+              </a:rPr>
+              <a:t>2</a:t>
+            </a:r>
+            <a:r>
+              <a:rPr lang="en-US" dirty="0" smtClean="0">
+                <a:latin typeface="Times New Roman" panose="02020603050405020304" pitchFamily="18" charset="0"/>
+                <a:cs typeface="Times New Roman" panose="02020603050405020304" pitchFamily="18" charset="0"/>
+              </a:rPr>
+              <a:t>. </a:t>
+            </a:r>
+            <a:r>
+              <a:rPr lang="en-US" dirty="0" smtClean="0">
+                <a:latin typeface="Times New Roman" panose="02020603050405020304" pitchFamily="18" charset="0"/>
+                <a:cs typeface="Times New Roman" panose="02020603050405020304" pitchFamily="18" charset="0"/>
+              </a:rPr>
+              <a:t>Is it harder to buy higher quality food because it goes bad faster?</a:t>
             </a:r>
           </a:p>
           <a:p>
             <a:pPr marL="0" indent="0">
               <a:buNone/>
             </a:pPr>
-            <a:endParaRPr lang="en-US" dirty="0"/>
+            <a:endParaRPr lang="en-US" dirty="0">
+              <a:latin typeface="Times New Roman" panose="02020603050405020304" pitchFamily="18" charset="0"/>
+              <a:cs typeface="Times New Roman" panose="02020603050405020304" pitchFamily="18" charset="0"/>
+            </a:endParaRPr>
           </a:p>
           <a:p>
             <a:pPr marL="0" indent="0">
               <a:buNone/>
             </a:pPr>
             <a:r>
-              <a:rPr lang="en-US" dirty="0" smtClean="0"/>
+              <a:rPr lang="en-US" dirty="0" smtClean="0">
+                <a:latin typeface="Times New Roman" panose="02020603050405020304" pitchFamily="18" charset="0"/>
+                <a:cs typeface="Times New Roman" panose="02020603050405020304" pitchFamily="18" charset="0"/>
+              </a:rPr>
               <a:t>-”I would say sometimes especially like with the organic stuff, it can just go bad too quickly so if I’m paying a higher price for it, it doesn’t even make sense unless I can buy an individual apple or something.”</a:t>
             </a:r>
           </a:p>
@@ -3784,7 +3889,10 @@
               <a:buNone/>
             </a:pPr>
             <a:r>
-              <a:rPr lang="en-US" dirty="0" smtClean="0"/>
+              <a:rPr lang="en-US" dirty="0" smtClean="0">
+                <a:latin typeface="Times New Roman" panose="02020603050405020304" pitchFamily="18" charset="0"/>
+                <a:cs typeface="Times New Roman" panose="02020603050405020304" pitchFamily="18" charset="0"/>
+              </a:rPr>
               <a:t>-”Yes, I think so; It is a problem.”</a:t>
             </a:r>
           </a:p>
@@ -3793,28 +3901,30 @@
               <a:buNone/>
             </a:pPr>
             <a:r>
-              <a:rPr lang="en-US" dirty="0" smtClean="0"/>
-              <a:t>-”No I think just because its more expensive. If you get something at the farmers market for example produce, that stays good longer than supermarket food.”</a:t>
-            </a:r>
-          </a:p>
-          <a:p>
-            <a:pPr marL="0" indent="0">
-              <a:buNone/>
-            </a:pPr>
-            <a:r>
-              <a:rPr lang="en-US" dirty="0" smtClean="0"/>
-              <a:t>-”Yeah definitely”</a:t>
-            </a:r>
-          </a:p>
-          <a:p>
-            <a:pPr marL="0" indent="0">
-              <a:buNone/>
-            </a:pPr>
-            <a:r>
-              <a:rPr lang="en-US" dirty="0" smtClean="0"/>
-              <a:t>-”Nope; I’m pretty content.”</a:t>
-            </a:r>
-            <a:endParaRPr lang="en-US" dirty="0"/>
+              <a:rPr lang="en-US" dirty="0" smtClean="0">
+                <a:latin typeface="Times New Roman" panose="02020603050405020304" pitchFamily="18" charset="0"/>
+                <a:cs typeface="Times New Roman" panose="02020603050405020304" pitchFamily="18" charset="0"/>
+              </a:rPr>
+              <a:t>-”</a:t>
+            </a:r>
+            <a:r>
+              <a:rPr lang="en-US" dirty="0" smtClean="0">
+                <a:latin typeface="Times New Roman" panose="02020603050405020304" pitchFamily="18" charset="0"/>
+                <a:cs typeface="Times New Roman" panose="02020603050405020304" pitchFamily="18" charset="0"/>
+              </a:rPr>
+              <a:t>Yeah definitely</a:t>
+            </a:r>
+            <a:r>
+              <a:rPr lang="en-US" dirty="0" smtClean="0">
+                <a:latin typeface="Times New Roman" panose="02020603050405020304" pitchFamily="18" charset="0"/>
+                <a:cs typeface="Times New Roman" panose="02020603050405020304" pitchFamily="18" charset="0"/>
+              </a:rPr>
+              <a:t>”</a:t>
+            </a:r>
+            <a:endParaRPr lang="en-US" dirty="0" smtClean="0">
+              <a:latin typeface="Times New Roman" panose="02020603050405020304" pitchFamily="18" charset="0"/>
+              <a:cs typeface="Times New Roman" panose="02020603050405020304" pitchFamily="18" charset="0"/>
+            </a:endParaRPr>
           </a:p>
         </p:txBody>
       </p:sp>
@@ -3832,6 +3942,301 @@
 </file>
 
 <file path=ppt/slides/slide6.xml><?xml version="1.0" encoding="utf-8"?>
+<p:sld xmlns:a="http://schemas.openxmlformats.org/drawingml/2006/main" xmlns:r="http://schemas.openxmlformats.org/officeDocument/2006/relationships" xmlns:p="http://schemas.openxmlformats.org/presentationml/2006/main">
+  <p:cSld>
+    <p:spTree>
+      <p:nvGrpSpPr>
+        <p:cNvPr id="1" name=""/>
+        <p:cNvGrpSpPr/>
+        <p:nvPr/>
+      </p:nvGrpSpPr>
+      <p:grpSpPr>
+        <a:xfrm>
+          <a:off x="0" y="0"/>
+          <a:ext cx="0" cy="0"/>
+          <a:chOff x="0" y="0"/>
+          <a:chExt cx="0" cy="0"/>
+        </a:xfrm>
+      </p:grpSpPr>
+      <p:sp>
+        <p:nvSpPr>
+          <p:cNvPr id="2" name="Title 1"/>
+          <p:cNvSpPr>
+            <a:spLocks noGrp="1"/>
+          </p:cNvSpPr>
+          <p:nvPr>
+            <p:ph type="title"/>
+          </p:nvPr>
+        </p:nvSpPr>
+        <p:spPr/>
+        <p:txBody>
+          <a:bodyPr/>
+          <a:lstStyle/>
+          <a:p>
+            <a:r>
+              <a:rPr lang="en-US" dirty="0">
+                <a:latin typeface="Times New Roman" panose="02020603050405020304" pitchFamily="18" charset="0"/>
+                <a:cs typeface="Times New Roman" panose="02020603050405020304" pitchFamily="18" charset="0"/>
+              </a:rPr>
+              <a:t>Sample Interview Answers</a:t>
+            </a:r>
+          </a:p>
+        </p:txBody>
+      </p:sp>
+      <p:sp>
+        <p:nvSpPr>
+          <p:cNvPr id="3" name="Content Placeholder 2"/>
+          <p:cNvSpPr>
+            <a:spLocks noGrp="1"/>
+          </p:cNvSpPr>
+          <p:nvPr>
+            <p:ph idx="1"/>
+          </p:nvPr>
+        </p:nvSpPr>
+        <p:spPr/>
+        <p:txBody>
+          <a:bodyPr>
+            <a:normAutofit/>
+          </a:bodyPr>
+          <a:lstStyle/>
+          <a:p>
+            <a:pPr marL="0" indent="0">
+              <a:buNone/>
+            </a:pPr>
+            <a:r>
+              <a:rPr lang="en-US" dirty="0">
+                <a:latin typeface="Times New Roman" panose="02020603050405020304" pitchFamily="18" charset="0"/>
+                <a:cs typeface="Times New Roman" panose="02020603050405020304" pitchFamily="18" charset="0"/>
+              </a:rPr>
+              <a:t>3. Do you use an item or app to aid in organizing your day? </a:t>
+            </a:r>
+            <a:endParaRPr lang="en-US" dirty="0" smtClean="0">
+              <a:latin typeface="Times New Roman" panose="02020603050405020304" pitchFamily="18" charset="0"/>
+              <a:cs typeface="Times New Roman" panose="02020603050405020304" pitchFamily="18" charset="0"/>
+            </a:endParaRPr>
+          </a:p>
+          <a:p>
+            <a:pPr marL="0" indent="0">
+              <a:buNone/>
+            </a:pPr>
+            <a:endParaRPr lang="en-US" dirty="0">
+              <a:latin typeface="Times New Roman" panose="02020603050405020304" pitchFamily="18" charset="0"/>
+              <a:cs typeface="Times New Roman" panose="02020603050405020304" pitchFamily="18" charset="0"/>
+            </a:endParaRPr>
+          </a:p>
+          <a:p>
+            <a:pPr marL="0" indent="0">
+              <a:buNone/>
+            </a:pPr>
+            <a:r>
+              <a:rPr lang="en-US" dirty="0" smtClean="0">
+                <a:latin typeface="Times New Roman" panose="02020603050405020304" pitchFamily="18" charset="0"/>
+                <a:cs typeface="Times New Roman" panose="02020603050405020304" pitchFamily="18" charset="0"/>
+              </a:rPr>
+              <a:t>-</a:t>
+            </a:r>
+            <a:r>
+              <a:rPr lang="en-US" dirty="0">
+                <a:latin typeface="Times New Roman" panose="02020603050405020304" pitchFamily="18" charset="0"/>
+                <a:cs typeface="Times New Roman" panose="02020603050405020304" pitchFamily="18" charset="0"/>
+              </a:rPr>
+              <a:t>Uses an organizer app and book for general schedule </a:t>
+            </a:r>
+            <a:r>
+              <a:rPr lang="en-US" dirty="0" smtClean="0">
+                <a:latin typeface="Times New Roman" panose="02020603050405020304" pitchFamily="18" charset="0"/>
+                <a:cs typeface="Times New Roman" panose="02020603050405020304" pitchFamily="18" charset="0"/>
+              </a:rPr>
+              <a:t>keeping</a:t>
+            </a:r>
+          </a:p>
+          <a:p>
+            <a:pPr marL="0" indent="0">
+              <a:buNone/>
+            </a:pPr>
+            <a:r>
+              <a:rPr lang="en-US" dirty="0" smtClean="0">
+                <a:latin typeface="Times New Roman" panose="02020603050405020304" pitchFamily="18" charset="0"/>
+                <a:cs typeface="Times New Roman" panose="02020603050405020304" pitchFamily="18" charset="0"/>
+              </a:rPr>
+              <a:t>-</a:t>
+            </a:r>
+            <a:r>
+              <a:rPr lang="en-US" dirty="0">
+                <a:latin typeface="Times New Roman" panose="02020603050405020304" pitchFamily="18" charset="0"/>
+                <a:cs typeface="Times New Roman" panose="02020603050405020304" pitchFamily="18" charset="0"/>
+              </a:rPr>
+              <a:t> No, he just writes things down as he goes, or he remembers it as best as he </a:t>
+            </a:r>
+            <a:r>
+              <a:rPr lang="en-US" dirty="0" smtClean="0">
+                <a:latin typeface="Times New Roman" panose="02020603050405020304" pitchFamily="18" charset="0"/>
+                <a:cs typeface="Times New Roman" panose="02020603050405020304" pitchFamily="18" charset="0"/>
+              </a:rPr>
+              <a:t>can</a:t>
+            </a:r>
+            <a:endParaRPr lang="en-US" dirty="0">
+              <a:latin typeface="Times New Roman" panose="02020603050405020304" pitchFamily="18" charset="0"/>
+              <a:cs typeface="Times New Roman" panose="02020603050405020304" pitchFamily="18" charset="0"/>
+            </a:endParaRPr>
+          </a:p>
+        </p:txBody>
+      </p:sp>
+    </p:spTree>
+    <p:extLst>
+      <p:ext uri="{BB962C8B-B14F-4D97-AF65-F5344CB8AC3E}">
+        <p14:creationId xmlns:p14="http://schemas.microsoft.com/office/powerpoint/2010/main" val="3476621897"/>
+      </p:ext>
+    </p:extLst>
+  </p:cSld>
+  <p:clrMapOvr>
+    <a:masterClrMapping/>
+  </p:clrMapOvr>
+</p:sld>
+</file>
+
+<file path=ppt/slides/slide7.xml><?xml version="1.0" encoding="utf-8"?>
+<p:sld xmlns:a="http://schemas.openxmlformats.org/drawingml/2006/main" xmlns:r="http://schemas.openxmlformats.org/officeDocument/2006/relationships" xmlns:p="http://schemas.openxmlformats.org/presentationml/2006/main">
+  <p:cSld>
+    <p:spTree>
+      <p:nvGrpSpPr>
+        <p:cNvPr id="1" name=""/>
+        <p:cNvGrpSpPr/>
+        <p:nvPr/>
+      </p:nvGrpSpPr>
+      <p:grpSpPr>
+        <a:xfrm>
+          <a:off x="0" y="0"/>
+          <a:ext cx="0" cy="0"/>
+          <a:chOff x="0" y="0"/>
+          <a:chExt cx="0" cy="0"/>
+        </a:xfrm>
+      </p:grpSpPr>
+      <p:sp>
+        <p:nvSpPr>
+          <p:cNvPr id="2" name="Title 1"/>
+          <p:cNvSpPr>
+            <a:spLocks noGrp="1"/>
+          </p:cNvSpPr>
+          <p:nvPr>
+            <p:ph type="title"/>
+          </p:nvPr>
+        </p:nvSpPr>
+        <p:spPr/>
+        <p:txBody>
+          <a:bodyPr/>
+          <a:lstStyle/>
+          <a:p>
+            <a:r>
+              <a:rPr lang="en-US" dirty="0">
+                <a:latin typeface="Times New Roman" panose="02020603050405020304" pitchFamily="18" charset="0"/>
+                <a:cs typeface="Times New Roman" panose="02020603050405020304" pitchFamily="18" charset="0"/>
+              </a:rPr>
+              <a:t>Sample Interview Answers</a:t>
+            </a:r>
+          </a:p>
+        </p:txBody>
+      </p:sp>
+      <p:sp>
+        <p:nvSpPr>
+          <p:cNvPr id="3" name="Content Placeholder 2"/>
+          <p:cNvSpPr>
+            <a:spLocks noGrp="1"/>
+          </p:cNvSpPr>
+          <p:nvPr>
+            <p:ph idx="1"/>
+          </p:nvPr>
+        </p:nvSpPr>
+        <p:spPr/>
+        <p:txBody>
+          <a:bodyPr>
+            <a:normAutofit fontScale="92500" lnSpcReduction="20000"/>
+          </a:bodyPr>
+          <a:lstStyle/>
+          <a:p>
+            <a:pPr marL="0" indent="0">
+              <a:buNone/>
+            </a:pPr>
+            <a:r>
+              <a:rPr lang="en-US" dirty="0">
+                <a:latin typeface="Times New Roman" panose="02020603050405020304" pitchFamily="18" charset="0"/>
+                <a:cs typeface="Times New Roman" panose="02020603050405020304" pitchFamily="18" charset="0"/>
+              </a:rPr>
+              <a:t>4. What is your opinion on the quality and functions of technology today</a:t>
+            </a:r>
+            <a:r>
+              <a:rPr lang="en-US" dirty="0" smtClean="0">
+                <a:latin typeface="Times New Roman" panose="02020603050405020304" pitchFamily="18" charset="0"/>
+                <a:cs typeface="Times New Roman" panose="02020603050405020304" pitchFamily="18" charset="0"/>
+              </a:rPr>
+              <a:t>?</a:t>
+            </a:r>
+          </a:p>
+          <a:p>
+            <a:pPr marL="0" indent="0">
+              <a:buNone/>
+            </a:pPr>
+            <a:endParaRPr lang="en-US" dirty="0">
+              <a:latin typeface="Times New Roman" panose="02020603050405020304" pitchFamily="18" charset="0"/>
+              <a:cs typeface="Times New Roman" panose="02020603050405020304" pitchFamily="18" charset="0"/>
+            </a:endParaRPr>
+          </a:p>
+          <a:p>
+            <a:pPr>
+              <a:buFontTx/>
+              <a:buChar char="-"/>
+            </a:pPr>
+            <a:r>
+              <a:rPr lang="en-US" dirty="0" smtClean="0">
+                <a:latin typeface="Times New Roman" panose="02020603050405020304" pitchFamily="18" charset="0"/>
+                <a:cs typeface="Times New Roman" panose="02020603050405020304" pitchFamily="18" charset="0"/>
+              </a:rPr>
+              <a:t>Loves </a:t>
+            </a:r>
+            <a:r>
+              <a:rPr lang="en-US" dirty="0">
+                <a:latin typeface="Times New Roman" panose="02020603050405020304" pitchFamily="18" charset="0"/>
+                <a:cs typeface="Times New Roman" panose="02020603050405020304" pitchFamily="18" charset="0"/>
+              </a:rPr>
+              <a:t>the older technology, feels the new forms of technology are too complicated to use, but understands that they help with everyday functions better then the older </a:t>
+            </a:r>
+            <a:r>
+              <a:rPr lang="en-US" dirty="0" smtClean="0">
+                <a:latin typeface="Times New Roman" panose="02020603050405020304" pitchFamily="18" charset="0"/>
+                <a:cs typeface="Times New Roman" panose="02020603050405020304" pitchFamily="18" charset="0"/>
+              </a:rPr>
+              <a:t>versions</a:t>
+            </a:r>
+          </a:p>
+          <a:p>
+            <a:pPr>
+              <a:buFontTx/>
+              <a:buChar char="-"/>
+            </a:pPr>
+            <a:r>
+              <a:rPr lang="en-US" dirty="0">
+                <a:latin typeface="Times New Roman" panose="02020603050405020304" pitchFamily="18" charset="0"/>
+                <a:cs typeface="Times New Roman" panose="02020603050405020304" pitchFamily="18" charset="0"/>
+              </a:rPr>
+              <a:t>He likes it, wishes he could afford the newer stuff, but using it is just great, adds a lot of better things to the world today even though it is “taking over our lives”</a:t>
+            </a:r>
+          </a:p>
+        </p:txBody>
+      </p:sp>
+    </p:spTree>
+    <p:extLst>
+      <p:ext uri="{BB962C8B-B14F-4D97-AF65-F5344CB8AC3E}">
+        <p14:creationId xmlns:p14="http://schemas.microsoft.com/office/powerpoint/2010/main" val="262959111"/>
+      </p:ext>
+    </p:extLst>
+  </p:cSld>
+  <p:clrMapOvr>
+    <a:masterClrMapping/>
+  </p:clrMapOvr>
+</p:sld>
+</file>
+
+<file path=ppt/slides/slide8.xml><?xml version="1.0" encoding="utf-8"?>
 <p:sld xmlns:a="http://schemas.openxmlformats.org/drawingml/2006/main" xmlns:r="http://schemas.openxmlformats.org/officeDocument/2006/relationships" xmlns:p="http://schemas.openxmlformats.org/presentationml/2006/main">
   <p:cSld>
     <p:spTree>
@@ -3905,10 +4310,16 @@
           <a:lstStyle/>
           <a:p>
             <a:r>
-              <a:rPr lang="en-US" dirty="0" smtClean="0"/>
+              <a:rPr lang="en-US" dirty="0" smtClean="0">
+                <a:latin typeface="Times New Roman" panose="02020603050405020304" pitchFamily="18" charset="0"/>
+                <a:cs typeface="Times New Roman" panose="02020603050405020304" pitchFamily="18" charset="0"/>
+              </a:rPr>
               <a:t>Works Cited</a:t>
             </a:r>
-            <a:endParaRPr lang="en-US" dirty="0"/>
+            <a:endParaRPr lang="en-US" dirty="0">
+              <a:latin typeface="Times New Roman" panose="02020603050405020304" pitchFamily="18" charset="0"/>
+              <a:cs typeface="Times New Roman" panose="02020603050405020304" pitchFamily="18" charset="0"/>
+            </a:endParaRPr>
           </a:p>
         </p:txBody>
       </p:sp>

</xml_diff>